<commit_message>
Modificada ruta de guardado pdf y zips
</commit_message>
<xml_diff>
--- a/CalculadoraNominas_v0.1.pptx
+++ b/CalculadoraNominas_v0.1.pptx
@@ -120,18 +120,6 @@
     </p:ext>
   </p:extLst>
 </p:presentation>
-</file>
-
-<file path=ppt/revisionInfo.xml><?xml version="1.0" encoding="utf-8"?>
-<p1510:revInfo xmlns:a="http://schemas.openxmlformats.org/drawingml/2006/main" xmlns:r="http://schemas.openxmlformats.org/officeDocument/2006/relationships" xmlns:p1510="http://schemas.microsoft.com/office/powerpoint/2015/10/main">
-  <p1510:revLst>
-    <p1510:client id="{0570463D-50FD-4C8D-A061-C9273B962A11}" v="710" dt="2022-06-09T20:39:15.255"/>
-    <p1510:client id="{06C8788A-B110-6F56-B722-B88A2C8826D0}" v="1" dt="2022-06-09T16:31:38.021"/>
-    <p1510:client id="{1BE2307B-C849-FD31-5AD2-3E4722E5BCD1}" v="10" dt="2022-06-09T20:53:14.560"/>
-    <p1510:client id="{623B2BBB-F322-CFCE-C266-FBDE76AA2ADC}" v="93" dt="2022-06-09T20:35:09.850"/>
-    <p1510:client id="{F8AE2F41-A7D5-4811-A7D9-9F9AECE130E3}" v="201" dt="2022-06-09T20:38:02.801"/>
-  </p1510:revLst>
-</p1510:revInfo>
 </file>
 
 <file path=ppt/notesMasters/notesMaster1.xml><?xml version="1.0" encoding="utf-8"?>
@@ -6545,7 +6533,7 @@
         </p:nvSpPr>
         <p:spPr>
           <a:xfrm>
-            <a:off x="7334265" y="1625608"/>
+            <a:off x="7258850" y="1255222"/>
             <a:ext cx="3882842" cy="2722164"/>
           </a:xfrm>
         </p:spPr>
@@ -6561,13 +6549,13 @@
               </a:lnSpc>
             </a:pPr>
             <a:r>
-              <a:rPr lang="es-ES" sz="6800">
+              <a:rPr lang="es-ES" sz="6800" dirty="0">
                 <a:latin typeface="Gill Sans Nova"/>
                 <a:cs typeface="Angsana New"/>
               </a:rPr>
               <a:t>Reto Final: Nóminas</a:t>
             </a:r>
-            <a:endParaRPr lang="es-ES" sz="6800">
+            <a:endParaRPr lang="es-ES" sz="6800" dirty="0">
               <a:latin typeface="Gill Sans Nova"/>
             </a:endParaRPr>
           </a:p>
@@ -7662,6 +7650,18 @@
   <p:clrMapOvr>
     <a:overrideClrMapping bg1="dk1" tx1="lt1" bg2="dk2" tx2="lt2" accent1="accent1" accent2="accent2" accent3="accent3" accent4="accent4" accent5="accent5" accent6="accent6" hlink="hlink" folHlink="folHlink"/>
   </p:clrMapOvr>
+  <mc:AlternateContent xmlns:mc="http://schemas.openxmlformats.org/markup-compatibility/2006">
+    <mc:Choice xmlns:p159="http://schemas.microsoft.com/office/powerpoint/2015/09/main" Requires="p159">
+      <p:transition xmlns:p14="http://schemas.microsoft.com/office/powerpoint/2010/main" spd="slow" p14:dur="2000">
+        <p159:morph option="byObject"/>
+      </p:transition>
+    </mc:Choice>
+    <mc:Fallback>
+      <p:transition spd="slow">
+        <p:fade/>
+      </p:transition>
+    </mc:Fallback>
+  </mc:AlternateContent>
   <p:timing>
     <p:tnLst>
       <p:par>
@@ -8198,6 +8198,18 @@
   <p:clrMapOvr>
     <a:overrideClrMapping bg1="dk1" tx1="lt1" bg2="dk2" tx2="lt2" accent1="accent1" accent2="accent2" accent3="accent3" accent4="accent4" accent5="accent5" accent6="accent6" hlink="hlink" folHlink="folHlink"/>
   </p:clrMapOvr>
+  <mc:AlternateContent xmlns:mc="http://schemas.openxmlformats.org/markup-compatibility/2006">
+    <mc:Choice xmlns:p159="http://schemas.microsoft.com/office/powerpoint/2015/09/main" Requires="p159">
+      <p:transition xmlns:p14="http://schemas.microsoft.com/office/powerpoint/2010/main" spd="slow" p14:dur="2000">
+        <p159:morph option="byObject"/>
+      </p:transition>
+    </mc:Choice>
+    <mc:Fallback>
+      <p:transition spd="slow">
+        <p:fade/>
+      </p:transition>
+    </mc:Fallback>
+  </mc:AlternateContent>
 </p:sld>
 </file>
 
@@ -8667,6 +8679,18 @@
   <p:clrMapOvr>
     <a:overrideClrMapping bg1="dk1" tx1="lt1" bg2="dk2" tx2="lt2" accent1="accent1" accent2="accent2" accent3="accent3" accent4="accent4" accent5="accent5" accent6="accent6" hlink="hlink" folHlink="folHlink"/>
   </p:clrMapOvr>
+  <mc:AlternateContent xmlns:mc="http://schemas.openxmlformats.org/markup-compatibility/2006">
+    <mc:Choice xmlns:p159="http://schemas.microsoft.com/office/powerpoint/2015/09/main" Requires="p159">
+      <p:transition xmlns:p14="http://schemas.microsoft.com/office/powerpoint/2010/main" spd="slow" p14:dur="2000">
+        <p159:morph option="byObject"/>
+      </p:transition>
+    </mc:Choice>
+    <mc:Fallback>
+      <p:transition spd="slow">
+        <p:fade/>
+      </p:transition>
+    </mc:Fallback>
+  </mc:AlternateContent>
 </p:sld>
 </file>
 
@@ -9007,7 +9031,7 @@
         </p:nvSpPr>
         <p:spPr>
           <a:xfrm>
-            <a:off x="388227" y="-558173"/>
+            <a:off x="433974" y="-323774"/>
             <a:ext cx="9447585" cy="2722164"/>
           </a:xfrm>
         </p:spPr>
@@ -9023,14 +9047,14 @@
               </a:lnSpc>
             </a:pPr>
             <a:r>
-              <a:rPr lang="es-ES" sz="6200">
+              <a:rPr lang="es-ES" sz="6200" dirty="0">
                 <a:latin typeface="Gill Sans Nova"/>
                 <a:ea typeface="+mj-lt"/>
                 <a:cs typeface="+mj-lt"/>
               </a:rPr>
               <a:t>Tablas de cotización y tipos de contrato en ficheros XML. </a:t>
             </a:r>
-            <a:endParaRPr lang="es-ES">
+            <a:endParaRPr lang="es-ES" dirty="0">
               <a:latin typeface="Gill Sans Nova"/>
             </a:endParaRPr>
           </a:p>
@@ -9105,6 +9129,18 @@
   <p:clrMapOvr>
     <a:overrideClrMapping bg1="dk1" tx1="lt1" bg2="dk2" tx2="lt2" accent1="accent1" accent2="accent2" accent3="accent3" accent4="accent4" accent5="accent5" accent6="accent6" hlink="hlink" folHlink="folHlink"/>
   </p:clrMapOvr>
+  <mc:AlternateContent xmlns:mc="http://schemas.openxmlformats.org/markup-compatibility/2006">
+    <mc:Choice xmlns:p159="http://schemas.microsoft.com/office/powerpoint/2015/09/main" Requires="p159">
+      <p:transition xmlns:p14="http://schemas.microsoft.com/office/powerpoint/2010/main" spd="slow" p14:dur="2000">
+        <p159:morph option="byObject"/>
+      </p:transition>
+    </mc:Choice>
+    <mc:Fallback>
+      <p:transition spd="slow">
+        <p:fade/>
+      </p:transition>
+    </mc:Fallback>
+  </mc:AlternateContent>
 </p:sld>
 </file>
 
@@ -9445,7 +9481,7 @@
         </p:nvSpPr>
         <p:spPr>
           <a:xfrm>
-            <a:off x="506384" y="-725426"/>
+            <a:off x="551177" y="-264310"/>
             <a:ext cx="9447585" cy="2722164"/>
           </a:xfrm>
         </p:spPr>
@@ -9461,19 +9497,19 @@
               </a:lnSpc>
             </a:pPr>
             <a:r>
-              <a:rPr lang="es-ES" sz="6200">
+              <a:rPr lang="es-ES" sz="6200" dirty="0">
                 <a:latin typeface="Gill Sans Nova"/>
               </a:rPr>
               <a:t>Creación y estructura de un </a:t>
             </a:r>
             <a:r>
-              <a:rPr lang="es-ES" sz="6200" err="1">
+              <a:rPr lang="es-ES" sz="6200" dirty="0" err="1">
                 <a:latin typeface="Gill Sans Nova"/>
               </a:rPr>
               <a:t>Pdf</a:t>
             </a:r>
             <a:r>
-              <a:rPr lang="es-ES" sz="6200">
+              <a:rPr lang="es-ES" sz="6200" dirty="0">
                 <a:latin typeface="Gill Sans Nova"/>
               </a:rPr>
               <a:t>.</a:t>
@@ -9515,7 +9551,7 @@
             </a:pPr>
             <a:r>
               <a:rPr lang="es-ES" b="1" dirty="0"/>
-              <a:t>Creación. (\</a:t>
+              <a:t>Creación. (</a:t>
             </a:r>
             <a:r>
               <a:rPr lang="es-ES" b="1" dirty="0" err="1"/>
@@ -9523,11 +9559,19 @@
             </a:r>
             <a:r>
               <a:rPr lang="es-ES" b="1" dirty="0"/>
-              <a:t>\target\</a:t>
+              <a:t>\</a:t>
             </a:r>
             <a:r>
               <a:rPr lang="es-ES" b="1" dirty="0" err="1"/>
-              <a:t>classes</a:t>
+              <a:t>src</a:t>
+            </a:r>
+            <a:r>
+              <a:rPr lang="es-ES" b="1" dirty="0"/>
+              <a:t>\test\</a:t>
+            </a:r>
+            <a:r>
+              <a:rPr lang="es-ES" b="1" dirty="0" err="1"/>
+              <a:t>resources</a:t>
             </a:r>
             <a:r>
               <a:rPr lang="es-ES" b="1" dirty="0"/>
@@ -9559,17 +9603,7 @@
             </a:pPr>
             <a:r>
               <a:rPr lang="es-ES" b="1" dirty="0"/>
-              <a:t>Ver PDF.</a:t>
-            </a:r>
-          </a:p>
-          <a:p>
-            <a:pPr marL="457200" indent="-457200">
-              <a:buFont typeface="Wingdings"/>
-              <a:buChar char="Ø"/>
-            </a:pPr>
-            <a:r>
-              <a:rPr lang="es-ES" b="1" dirty="0"/>
-              <a:t>Comprimir (\</a:t>
+              <a:t>Comprimir (</a:t>
             </a:r>
             <a:r>
               <a:rPr lang="es-ES" b="1" dirty="0" err="1"/>
@@ -9577,11 +9611,19 @@
             </a:r>
             <a:r>
               <a:rPr lang="es-ES" b="1" dirty="0"/>
-              <a:t>\target\</a:t>
+              <a:t>\</a:t>
             </a:r>
             <a:r>
               <a:rPr lang="es-ES" b="1" dirty="0" err="1"/>
-              <a:t>classes</a:t>
+              <a:t>src</a:t>
+            </a:r>
+            <a:r>
+              <a:rPr lang="es-ES" b="1" dirty="0"/>
+              <a:t>\test\</a:t>
+            </a:r>
+            <a:r>
+              <a:rPr lang="es-ES" b="1" dirty="0" err="1"/>
+              <a:t>resources</a:t>
             </a:r>
             <a:r>
               <a:rPr lang="es-ES" b="1" dirty="0"/>
@@ -9603,6 +9645,18 @@
   <p:clrMapOvr>
     <a:overrideClrMapping bg1="dk1" tx1="lt1" bg2="dk2" tx2="lt2" accent1="accent1" accent2="accent2" accent3="accent3" accent4="accent4" accent5="accent5" accent6="accent6" hlink="hlink" folHlink="folHlink"/>
   </p:clrMapOvr>
+  <mc:AlternateContent xmlns:mc="http://schemas.openxmlformats.org/markup-compatibility/2006">
+    <mc:Choice xmlns:p159="http://schemas.microsoft.com/office/powerpoint/2015/09/main" Requires="p159">
+      <p:transition xmlns:p14="http://schemas.microsoft.com/office/powerpoint/2010/main" spd="slow" p14:dur="2000">
+        <p159:morph option="byObject"/>
+      </p:transition>
+    </mc:Choice>
+    <mc:Fallback>
+      <p:transition spd="slow">
+        <p:fade/>
+      </p:transition>
+    </mc:Fallback>
+  </mc:AlternateContent>
 </p:sld>
 </file>
 
@@ -9943,7 +9997,7 @@
         </p:nvSpPr>
         <p:spPr>
           <a:xfrm>
-            <a:off x="388227" y="-558173"/>
+            <a:off x="433974" y="-384452"/>
             <a:ext cx="9447585" cy="2722164"/>
           </a:xfrm>
         </p:spPr>
@@ -9959,13 +10013,13 @@
               </a:lnSpc>
             </a:pPr>
             <a:r>
-              <a:rPr lang="es-ES" sz="6200">
+              <a:rPr lang="es-ES" sz="6200" dirty="0">
                 <a:ea typeface="+mj-lt"/>
                 <a:cs typeface="+mj-lt"/>
               </a:rPr>
               <a:t>Diseño la batería de pruebas unitarias</a:t>
             </a:r>
-            <a:endParaRPr lang="es-ES" sz="6200"/>
+            <a:endParaRPr lang="es-ES" sz="6200" dirty="0"/>
           </a:p>
         </p:txBody>
       </p:sp>
@@ -10035,6 +10089,18 @@
   <p:clrMapOvr>
     <a:overrideClrMapping bg1="dk1" tx1="lt1" bg2="dk2" tx2="lt2" accent1="accent1" accent2="accent2" accent3="accent3" accent4="accent4" accent5="accent5" accent6="accent6" hlink="hlink" folHlink="folHlink"/>
   </p:clrMapOvr>
+  <mc:AlternateContent xmlns:mc="http://schemas.openxmlformats.org/markup-compatibility/2006">
+    <mc:Choice xmlns:p159="http://schemas.microsoft.com/office/powerpoint/2015/09/main" Requires="p159">
+      <p:transition xmlns:p14="http://schemas.microsoft.com/office/powerpoint/2010/main" spd="slow" p14:dur="2000">
+        <p159:morph option="byObject"/>
+      </p:transition>
+    </mc:Choice>
+    <mc:Fallback>
+      <p:transition spd="slow">
+        <p:fade/>
+      </p:transition>
+    </mc:Fallback>
+  </mc:AlternateContent>
 </p:sld>
 </file>
 
@@ -10542,6 +10608,18 @@
   <p:clrMapOvr>
     <a:overrideClrMapping bg1="dk1" tx1="lt1" bg2="dk2" tx2="lt2" accent1="accent1" accent2="accent2" accent3="accent3" accent4="accent4" accent5="accent5" accent6="accent6" hlink="hlink" folHlink="folHlink"/>
   </p:clrMapOvr>
+  <mc:AlternateContent xmlns:mc="http://schemas.openxmlformats.org/markup-compatibility/2006">
+    <mc:Choice xmlns:p159="http://schemas.microsoft.com/office/powerpoint/2015/09/main" Requires="p159">
+      <p:transition xmlns:p14="http://schemas.microsoft.com/office/powerpoint/2010/main" spd="slow" p14:dur="2000">
+        <p159:morph option="byObject"/>
+      </p:transition>
+    </mc:Choice>
+    <mc:Fallback>
+      <p:transition spd="slow">
+        <p:fade/>
+      </p:transition>
+    </mc:Fallback>
+  </mc:AlternateContent>
 </p:sld>
 </file>
 

</xml_diff>